<commit_message>
Tweaked slides explain order in which push and pop instructions handle registers.
</commit_message>
<xml_diff>
--- a/NXP/Slides/Chapter 4/CPU.pptx
+++ b/NXP/Slides/Chapter 4/CPU.pptx
@@ -31320,8 +31320,20 @@
           <a:p>
             <a:pPr lvl="1"/>
             <a:r>
+              <a:rPr lang="en-US" sz="1800" b="1" dirty="0"/>
+              <a:t>Largest </a:t>
+            </a:r>
+            <a:r>
               <a:rPr lang="en-US" sz="1800" dirty="0"/>
-              <a:t>Always pushes registers in same order</a:t>
+              <a:t>register number pushed first (to </a:t>
+            </a:r>
+            <a:r>
+              <a:rPr lang="en-US" sz="1800" b="1" dirty="0"/>
+              <a:t>largest </a:t>
+            </a:r>
+            <a:r>
+              <a:rPr lang="en-US" sz="1800" dirty="0"/>
+              <a:t>address)</a:t>
             </a:r>
           </a:p>
           <a:p>
@@ -31369,8 +31381,20 @@
           <a:p>
             <a:pPr lvl="1"/>
             <a:r>
+              <a:rPr lang="en-US" sz="1800" b="1" dirty="0"/>
+              <a:t>Smallest </a:t>
+            </a:r>
+            <a:r>
               <a:rPr lang="en-US" sz="1800" dirty="0"/>
-              <a:t>Always pops registers in same order (opposite of pushing)</a:t>
+              <a:t>register number popped first (from </a:t>
+            </a:r>
+            <a:r>
+              <a:rPr lang="en-US" sz="1800" b="1" dirty="0"/>
+              <a:t>smallest </a:t>
+            </a:r>
+            <a:r>
+              <a:rPr lang="en-US" sz="1800" dirty="0"/>
+              <a:t>address)</a:t>
             </a:r>
           </a:p>
         </p:txBody>

</xml_diff>